<commit_message>
updated link in pptx
</commit_message>
<xml_diff>
--- a/Presentation/WebAPI2LunchnLearn.pptx
+++ b/Presentation/WebAPI2LunchnLearn.pptx
@@ -155,6 +155,10 @@
     </p:ext>
   </p:extLst>
 </p:presentation>
+</file>
+
+<file path=ppt/revisionInfo.xml><?xml version="1.0" encoding="utf-8"?>
+<p1510:revInfo xmlns:a="http://schemas.openxmlformats.org/drawingml/2006/main" xmlns:r="http://schemas.openxmlformats.org/officeDocument/2006/relationships" xmlns:p1510="http://schemas.microsoft.com/office/powerpoint/2015/10/main"/>
 </file>
 
 <file path=ppt/changesInfos/changesInfo1.xml><?xml version="1.0" encoding="utf-8"?>
@@ -536,7 +540,7 @@
           <a:p>
             <a:fld id="{B398E617-937E-FC4A-8748-C6BABACC53FE}" type="datetimeFigureOut">
               <a:rPr lang="en-US" smtClean="0"/>
-              <a:t>4/18/2018</a:t>
+              <a:t>4/19/2018</a:t>
             </a:fld>
             <a:endParaRPr lang="en-US"/>
           </a:p>
@@ -701,7 +705,7 @@
           <a:p>
             <a:fld id="{1DC1E76F-63EC-3849-B890-E56FE4AABDB1}" type="datetimeFigureOut">
               <a:rPr lang="en-US" smtClean="0"/>
-              <a:t>4/18/2018</a:t>
+              <a:t>4/19/2018</a:t>
             </a:fld>
             <a:endParaRPr lang="en-US"/>
           </a:p>
@@ -3342,7 +3346,7 @@
           <a:p>
             <a:fld id="{E277F4CE-098B-AC47-9403-6702D754860E}" type="datetimeFigureOut">
               <a:rPr lang="en-US" smtClean="0"/>
-              <a:t>4/18/2018</a:t>
+              <a:t>4/19/2018</a:t>
             </a:fld>
             <a:endParaRPr lang="en-US"/>
           </a:p>
@@ -3937,7 +3941,7 @@
           <a:p>
             <a:fld id="{E277F4CE-098B-AC47-9403-6702D754860E}" type="datetimeFigureOut">
               <a:rPr lang="en-US" smtClean="0"/>
-              <a:t>4/18/2018</a:t>
+              <a:t>4/19/2018</a:t>
             </a:fld>
             <a:endParaRPr lang="en-US"/>
           </a:p>
@@ -4899,7 +4903,7 @@
           <a:p>
             <a:fld id="{E277F4CE-098B-AC47-9403-6702D754860E}" type="datetimeFigureOut">
               <a:rPr lang="en-US" smtClean="0"/>
-              <a:t>4/18/2018</a:t>
+              <a:t>4/19/2018</a:t>
             </a:fld>
             <a:endParaRPr lang="en-US"/>
           </a:p>
@@ -5554,7 +5558,7 @@
           <a:p>
             <a:fld id="{E277F4CE-098B-AC47-9403-6702D754860E}" type="datetimeFigureOut">
               <a:rPr lang="en-US" smtClean="0"/>
-              <a:t>4/18/2018</a:t>
+              <a:t>4/19/2018</a:t>
             </a:fld>
             <a:endParaRPr lang="en-US"/>
           </a:p>
@@ -5861,7 +5865,7 @@
           <a:p>
             <a:fld id="{E277F4CE-098B-AC47-9403-6702D754860E}" type="datetimeFigureOut">
               <a:rPr lang="en-US" smtClean="0"/>
-              <a:t>4/18/2018</a:t>
+              <a:t>4/19/2018</a:t>
             </a:fld>
             <a:endParaRPr lang="en-US"/>
           </a:p>
@@ -9225,7 +9229,7 @@
           <a:p>
             <a:fld id="{E277F4CE-098B-AC47-9403-6702D754860E}" type="datetimeFigureOut">
               <a:rPr lang="en-US" smtClean="0"/>
-              <a:t>4/18/2018</a:t>
+              <a:t>4/19/2018</a:t>
             </a:fld>
             <a:endParaRPr lang="en-US"/>
           </a:p>
@@ -9503,7 +9507,7 @@
           <a:p>
             <a:fld id="{E277F4CE-098B-AC47-9403-6702D754860E}" type="datetimeFigureOut">
               <a:rPr lang="en-US" smtClean="0"/>
-              <a:t>4/18/2018</a:t>
+              <a:t>4/19/2018</a:t>
             </a:fld>
             <a:endParaRPr lang="en-US"/>
           </a:p>
@@ -12430,7 +12434,7 @@
               <a:rPr lang="en-US" sz="2800" dirty="0">
                 <a:hlinkClick r:id="rId2"/>
               </a:rPr>
-              <a:t> https://tinyurl.com/PresCodeSamples</a:t>
+              <a:t> https://tinyurl.com/WebAPI2Demo</a:t>
             </a:r>
           </a:p>
           <a:p>

</xml_diff>